<commit_message>
dsp mini projekt added
</commit_message>
<xml_diff>
--- a/DSP/Ditte-Powerpoints/dspExamQ10.pptx
+++ b/DSP/Ditte-Powerpoints/dspExamQ10.pptx
@@ -5,7 +5,7 @@
     <p:sldMasterId id="2147483648" r:id="rId1"/>
   </p:sldMasterIdLst>
   <p:notesMasterIdLst>
-    <p:notesMasterId r:id="rId18"/>
+    <p:notesMasterId r:id="rId19"/>
   </p:notesMasterIdLst>
   <p:sldIdLst>
     <p:sldId id="256" r:id="rId2"/>
@@ -19,11 +19,12 @@
     <p:sldId id="265" r:id="rId10"/>
     <p:sldId id="266" r:id="rId11"/>
     <p:sldId id="267" r:id="rId12"/>
-    <p:sldId id="270" r:id="rId13"/>
-    <p:sldId id="271" r:id="rId14"/>
-    <p:sldId id="272" r:id="rId15"/>
-    <p:sldId id="274" r:id="rId16"/>
-    <p:sldId id="275" r:id="rId17"/>
+    <p:sldId id="275" r:id="rId13"/>
+    <p:sldId id="270" r:id="rId14"/>
+    <p:sldId id="271" r:id="rId15"/>
+    <p:sldId id="272" r:id="rId16"/>
+    <p:sldId id="274" r:id="rId17"/>
+    <p:sldId id="276" r:id="rId18"/>
   </p:sldIdLst>
   <p:sldSz cx="12192000" cy="6858000"/>
   <p:notesSz cx="6858000" cy="9144000"/>
@@ -687,7 +688,7 @@
           <a:p>
             <a:fld id="{237DF243-990D-452E-B2F0-0A24C40DD102}" type="datetimeFigureOut">
               <a:rPr lang="en-US" smtClean="0"/>
-              <a:t>1/14/2025</a:t>
+              <a:t>1/15/2025</a:t>
             </a:fld>
             <a:endParaRPr lang="en-US"/>
           </a:p>
@@ -1101,7 +1102,7 @@
           <a:p>
             <a:fld id="{9CB904D7-2B70-4964-9B23-4E5B349F082D}" type="datetimeFigureOut">
               <a:rPr lang="en-US" smtClean="0"/>
-              <a:t>1/14/2025</a:t>
+              <a:t>1/15/2025</a:t>
             </a:fld>
             <a:endParaRPr lang="en-US"/>
           </a:p>
@@ -1306,7 +1307,7 @@
           <a:p>
             <a:fld id="{9CB904D7-2B70-4964-9B23-4E5B349F082D}" type="datetimeFigureOut">
               <a:rPr lang="en-US" smtClean="0"/>
-              <a:t>1/14/2025</a:t>
+              <a:t>1/15/2025</a:t>
             </a:fld>
             <a:endParaRPr lang="en-US"/>
           </a:p>
@@ -1581,7 +1582,7 @@
           <a:p>
             <a:fld id="{9CB904D7-2B70-4964-9B23-4E5B349F082D}" type="datetimeFigureOut">
               <a:rPr lang="en-US" smtClean="0"/>
-              <a:t>1/14/2025</a:t>
+              <a:t>1/15/2025</a:t>
             </a:fld>
             <a:endParaRPr lang="en-US"/>
           </a:p>
@@ -1846,7 +1847,7 @@
           <a:p>
             <a:fld id="{9CB904D7-2B70-4964-9B23-4E5B349F082D}" type="datetimeFigureOut">
               <a:rPr lang="en-US" smtClean="0"/>
-              <a:t>1/14/2025</a:t>
+              <a:t>1/15/2025</a:t>
             </a:fld>
             <a:endParaRPr lang="en-US"/>
           </a:p>
@@ -2258,7 +2259,7 @@
           <a:p>
             <a:fld id="{9CB904D7-2B70-4964-9B23-4E5B349F082D}" type="datetimeFigureOut">
               <a:rPr lang="en-US" smtClean="0"/>
-              <a:t>1/14/2025</a:t>
+              <a:t>1/15/2025</a:t>
             </a:fld>
             <a:endParaRPr lang="en-US"/>
           </a:p>
@@ -2399,7 +2400,7 @@
           <a:p>
             <a:fld id="{9CB904D7-2B70-4964-9B23-4E5B349F082D}" type="datetimeFigureOut">
               <a:rPr lang="en-US" smtClean="0"/>
-              <a:t>1/14/2025</a:t>
+              <a:t>1/15/2025</a:t>
             </a:fld>
             <a:endParaRPr lang="en-US"/>
           </a:p>
@@ -2512,7 +2513,7 @@
           <a:p>
             <a:fld id="{9CB904D7-2B70-4964-9B23-4E5B349F082D}" type="datetimeFigureOut">
               <a:rPr lang="en-US" smtClean="0"/>
-              <a:t>1/14/2025</a:t>
+              <a:t>1/15/2025</a:t>
             </a:fld>
             <a:endParaRPr lang="en-US"/>
           </a:p>
@@ -2753,7 +2754,7 @@
           <a:p>
             <a:fld id="{9CB904D7-2B70-4964-9B23-4E5B349F082D}" type="datetimeFigureOut">
               <a:rPr lang="en-US" smtClean="0"/>
-              <a:t>1/14/2025</a:t>
+              <a:t>1/15/2025</a:t>
             </a:fld>
             <a:endParaRPr lang="en-US"/>
           </a:p>
@@ -3783,6 +3784,66 @@
       </p:grpSpPr>
       <p:pic>
         <p:nvPicPr>
+          <p:cNvPr id="5" name="Picture 4">
+            <a:extLst>
+              <a:ext uri="{FF2B5EF4-FFF2-40B4-BE49-F238E27FC236}">
+                <a16:creationId xmlns:a16="http://schemas.microsoft.com/office/drawing/2014/main" id="{434F337B-202C-3A60-BB75-930A0DC60AD2}"/>
+              </a:ext>
+            </a:extLst>
+          </p:cNvPr>
+          <p:cNvPicPr>
+            <a:picLocks noChangeAspect="1"/>
+          </p:cNvPicPr>
+          <p:nvPr/>
+        </p:nvPicPr>
+        <p:blipFill>
+          <a:blip r:embed="rId2"/>
+          <a:stretch>
+            <a:fillRect/>
+          </a:stretch>
+        </p:blipFill>
+        <p:spPr>
+          <a:xfrm>
+            <a:off x="0" y="758497"/>
+            <a:ext cx="12192000" cy="5341006"/>
+          </a:xfrm>
+          <a:prstGeom prst="rect">
+            <a:avLst/>
+          </a:prstGeom>
+        </p:spPr>
+      </p:pic>
+    </p:spTree>
+    <p:extLst>
+      <p:ext uri="{BB962C8B-B14F-4D97-AF65-F5344CB8AC3E}">
+        <p14:creationId xmlns:p14="http://schemas.microsoft.com/office/powerpoint/2010/main" val="2364241072"/>
+      </p:ext>
+    </p:extLst>
+  </p:cSld>
+  <p:clrMapOvr>
+    <a:masterClrMapping/>
+  </p:clrMapOvr>
+</p:sld>
+</file>
+
+<file path=ppt/slides/slide13.xml><?xml version="1.0" encoding="utf-8"?>
+<p:sld xmlns:a="http://schemas.openxmlformats.org/drawingml/2006/main" xmlns:r="http://schemas.openxmlformats.org/officeDocument/2006/relationships" xmlns:p="http://schemas.openxmlformats.org/presentationml/2006/main">
+  <p:cSld>
+    <p:spTree>
+      <p:nvGrpSpPr>
+        <p:cNvPr id="1" name=""/>
+        <p:cNvGrpSpPr/>
+        <p:nvPr/>
+      </p:nvGrpSpPr>
+      <p:grpSpPr>
+        <a:xfrm>
+          <a:off x="0" y="0"/>
+          <a:ext cx="0" cy="0"/>
+          <a:chOff x="0" y="0"/>
+          <a:chExt cx="0" cy="0"/>
+        </a:xfrm>
+      </p:grpSpPr>
+      <p:pic>
+        <p:nvPicPr>
           <p:cNvPr id="3" name="Picture 2">
             <a:extLst>
               <a:ext uri="{FF2B5EF4-FFF2-40B4-BE49-F238E27FC236}">
@@ -3824,7 +3885,7 @@
 </p:sld>
 </file>
 
-<file path=ppt/slides/slide13.xml><?xml version="1.0" encoding="utf-8"?>
+<file path=ppt/slides/slide14.xml><?xml version="1.0" encoding="utf-8"?>
 <p:sld xmlns:a="http://schemas.openxmlformats.org/drawingml/2006/main" xmlns:r="http://schemas.openxmlformats.org/officeDocument/2006/relationships" xmlns:p="http://schemas.openxmlformats.org/presentationml/2006/main">
   <p:cSld>
     <p:spTree>
@@ -3884,7 +3945,7 @@
 </p:sld>
 </file>
 
-<file path=ppt/slides/slide14.xml><?xml version="1.0" encoding="utf-8"?>
+<file path=ppt/slides/slide15.xml><?xml version="1.0" encoding="utf-8"?>
 <p:sld xmlns:a="http://schemas.openxmlformats.org/drawingml/2006/main" xmlns:r="http://schemas.openxmlformats.org/officeDocument/2006/relationships" xmlns:p="http://schemas.openxmlformats.org/presentationml/2006/main">
   <p:cSld>
     <p:spTree>
@@ -3944,7 +4005,7 @@
 </p:sld>
 </file>
 
-<file path=ppt/slides/slide15.xml><?xml version="1.0" encoding="utf-8"?>
+<file path=ppt/slides/slide16.xml><?xml version="1.0" encoding="utf-8"?>
 <p:sld xmlns:a="http://schemas.openxmlformats.org/drawingml/2006/main" xmlns:r="http://schemas.openxmlformats.org/officeDocument/2006/relationships" xmlns:p="http://schemas.openxmlformats.org/presentationml/2006/main">
   <p:cSld>
     <p:spTree>
@@ -4004,12 +4065,18 @@
 </p:sld>
 </file>
 
-<file path=ppt/slides/slide16.xml><?xml version="1.0" encoding="utf-8"?>
+<file path=ppt/slides/slide17.xml><?xml version="1.0" encoding="utf-8"?>
 <p:sld xmlns:a="http://schemas.openxmlformats.org/drawingml/2006/main" xmlns:r="http://schemas.openxmlformats.org/officeDocument/2006/relationships" xmlns:p="http://schemas.openxmlformats.org/presentationml/2006/main">
   <p:cSld>
     <p:spTree>
       <p:nvGrpSpPr>
-        <p:cNvPr id="1" name=""/>
+        <p:cNvPr id="1" name="">
+          <a:extLst>
+            <a:ext uri="{FF2B5EF4-FFF2-40B4-BE49-F238E27FC236}">
+              <a16:creationId xmlns:a16="http://schemas.microsoft.com/office/drawing/2014/main" id="{B9F3D2E9-E94E-5F2D-6383-211C7E29CC45}"/>
+            </a:ext>
+          </a:extLst>
+        </p:cNvPr>
         <p:cNvGrpSpPr/>
         <p:nvPr/>
       </p:nvGrpSpPr>
@@ -4026,7 +4093,7 @@
           <p:cNvPr id="5" name="Picture 4">
             <a:extLst>
               <a:ext uri="{FF2B5EF4-FFF2-40B4-BE49-F238E27FC236}">
-                <a16:creationId xmlns:a16="http://schemas.microsoft.com/office/drawing/2014/main" id="{434F337B-202C-3A60-BB75-930A0DC60AD2}"/>
+                <a16:creationId xmlns:a16="http://schemas.microsoft.com/office/drawing/2014/main" id="{68550B1F-F1E1-B288-32D1-9D59A1159E3E}"/>
               </a:ext>
             </a:extLst>
           </p:cNvPr>
@@ -4054,7 +4121,7 @@
     </p:spTree>
     <p:extLst>
       <p:ext uri="{BB962C8B-B14F-4D97-AF65-F5344CB8AC3E}">
-        <p14:creationId xmlns:p14="http://schemas.microsoft.com/office/powerpoint/2010/main" val="2364241072"/>
+        <p14:creationId xmlns:p14="http://schemas.microsoft.com/office/powerpoint/2010/main" val="3117810048"/>
       </p:ext>
     </p:extLst>
   </p:cSld>

</xml_diff>